<commit_message>
Added source for session 2 demos
</commit_message>
<xml_diff>
--- a/LearningAndroidSession1.pptx
+++ b/LearningAndroidSession1.pptx
@@ -4,6 +4,9 @@
   <p:sldMasterIdLst>
     <p:sldMasterId id="2147483660" r:id="rId1"/>
   </p:sldMasterIdLst>
+  <p:notesMasterIdLst>
+    <p:notesMasterId r:id="rId31"/>
+  </p:notesMasterIdLst>
   <p:sldIdLst>
     <p:sldId id="256" r:id="rId2"/>
     <p:sldId id="257" r:id="rId3"/>
@@ -135,6 +138,440 @@
 </p:presentation>
 </file>
 
+<file path=ppt/notesMasters/notesMaster1.xml><?xml version="1.0" encoding="utf-8"?>
+<p:notesMaster xmlns:a="http://schemas.openxmlformats.org/drawingml/2006/main" xmlns:r="http://schemas.openxmlformats.org/officeDocument/2006/relationships" xmlns:p="http://schemas.openxmlformats.org/presentationml/2006/main">
+  <p:cSld>
+    <p:bg>
+      <p:bgRef idx="1001">
+        <a:schemeClr val="bg1"/>
+      </p:bgRef>
+    </p:bg>
+    <p:spTree>
+      <p:nvGrpSpPr>
+        <p:cNvPr id="1" name=""/>
+        <p:cNvGrpSpPr/>
+        <p:nvPr/>
+      </p:nvGrpSpPr>
+      <p:grpSpPr>
+        <a:xfrm>
+          <a:off x="0" y="0"/>
+          <a:ext cx="0" cy="0"/>
+          <a:chOff x="0" y="0"/>
+          <a:chExt cx="0" cy="0"/>
+        </a:xfrm>
+      </p:grpSpPr>
+      <p:sp>
+        <p:nvSpPr>
+          <p:cNvPr id="2" name="Header Placeholder 1"/>
+          <p:cNvSpPr>
+            <a:spLocks noGrp="1"/>
+          </p:cNvSpPr>
+          <p:nvPr>
+            <p:ph type="hdr" sz="quarter"/>
+          </p:nvPr>
+        </p:nvSpPr>
+        <p:spPr>
+          <a:xfrm>
+            <a:off x="0" y="0"/>
+            <a:ext cx="2971800" cy="457200"/>
+          </a:xfrm>
+          <a:prstGeom prst="rect">
+            <a:avLst/>
+          </a:prstGeom>
+        </p:spPr>
+        <p:txBody>
+          <a:bodyPr vert="horz" lIns="91440" tIns="45720" rIns="91440" bIns="45720" rtlCol="0"/>
+          <a:lstStyle>
+            <a:lvl1pPr algn="l">
+              <a:defRPr sz="1200"/>
+            </a:lvl1pPr>
+          </a:lstStyle>
+          <a:p>
+            <a:endParaRPr lang="en-US"/>
+          </a:p>
+        </p:txBody>
+      </p:sp>
+      <p:sp>
+        <p:nvSpPr>
+          <p:cNvPr id="3" name="Date Placeholder 2"/>
+          <p:cNvSpPr>
+            <a:spLocks noGrp="1"/>
+          </p:cNvSpPr>
+          <p:nvPr>
+            <p:ph type="dt" idx="1"/>
+          </p:nvPr>
+        </p:nvSpPr>
+        <p:spPr>
+          <a:xfrm>
+            <a:off x="3884613" y="0"/>
+            <a:ext cx="2971800" cy="457200"/>
+          </a:xfrm>
+          <a:prstGeom prst="rect">
+            <a:avLst/>
+          </a:prstGeom>
+        </p:spPr>
+        <p:txBody>
+          <a:bodyPr vert="horz" lIns="91440" tIns="45720" rIns="91440" bIns="45720" rtlCol="0"/>
+          <a:lstStyle>
+            <a:lvl1pPr algn="r">
+              <a:defRPr sz="1200"/>
+            </a:lvl1pPr>
+          </a:lstStyle>
+          <a:p>
+            <a:fld id="{CB9A92AD-A5F5-2D4E-969F-7695E40976C2}" type="datetimeFigureOut">
+              <a:rPr lang="en-US" smtClean="0"/>
+              <a:t>2/7/13</a:t>
+            </a:fld>
+            <a:endParaRPr lang="en-US"/>
+          </a:p>
+        </p:txBody>
+      </p:sp>
+      <p:sp>
+        <p:nvSpPr>
+          <p:cNvPr id="4" name="Slide Image Placeholder 3"/>
+          <p:cNvSpPr>
+            <a:spLocks noGrp="1" noRot="1" noChangeAspect="1"/>
+          </p:cNvSpPr>
+          <p:nvPr>
+            <p:ph type="sldImg" idx="2"/>
+          </p:nvPr>
+        </p:nvSpPr>
+        <p:spPr>
+          <a:xfrm>
+            <a:off x="1143000" y="685800"/>
+            <a:ext cx="4572000" cy="3429000"/>
+          </a:xfrm>
+          <a:prstGeom prst="rect">
+            <a:avLst/>
+          </a:prstGeom>
+          <a:noFill/>
+          <a:ln w="12700">
+            <a:solidFill>
+              <a:prstClr val="black"/>
+            </a:solidFill>
+          </a:ln>
+        </p:spPr>
+        <p:txBody>
+          <a:bodyPr vert="horz" lIns="91440" tIns="45720" rIns="91440" bIns="45720" rtlCol="0" anchor="ctr"/>
+          <a:lstStyle/>
+          <a:p>
+            <a:endParaRPr lang="en-US"/>
+          </a:p>
+        </p:txBody>
+      </p:sp>
+      <p:sp>
+        <p:nvSpPr>
+          <p:cNvPr id="5" name="Notes Placeholder 4"/>
+          <p:cNvSpPr>
+            <a:spLocks noGrp="1"/>
+          </p:cNvSpPr>
+          <p:nvPr>
+            <p:ph type="body" sz="quarter" idx="3"/>
+          </p:nvPr>
+        </p:nvSpPr>
+        <p:spPr>
+          <a:xfrm>
+            <a:off x="685800" y="4343400"/>
+            <a:ext cx="5486400" cy="4114800"/>
+          </a:xfrm>
+          <a:prstGeom prst="rect">
+            <a:avLst/>
+          </a:prstGeom>
+        </p:spPr>
+        <p:txBody>
+          <a:bodyPr vert="horz" lIns="91440" tIns="45720" rIns="91440" bIns="45720" rtlCol="0"/>
+          <a:lstStyle/>
+          <a:p>
+            <a:pPr lvl="0"/>
+            <a:r>
+              <a:rPr lang="en-US" smtClean="0"/>
+              <a:t>Click to edit Master text styles</a:t>
+            </a:r>
+          </a:p>
+          <a:p>
+            <a:pPr lvl="1"/>
+            <a:r>
+              <a:rPr lang="en-US" smtClean="0"/>
+              <a:t>Second level</a:t>
+            </a:r>
+          </a:p>
+          <a:p>
+            <a:pPr lvl="2"/>
+            <a:r>
+              <a:rPr lang="en-US" smtClean="0"/>
+              <a:t>Third level</a:t>
+            </a:r>
+          </a:p>
+          <a:p>
+            <a:pPr lvl="3"/>
+            <a:r>
+              <a:rPr lang="en-US" smtClean="0"/>
+              <a:t>Fourth level</a:t>
+            </a:r>
+          </a:p>
+          <a:p>
+            <a:pPr lvl="4"/>
+            <a:r>
+              <a:rPr lang="en-US" smtClean="0"/>
+              <a:t>Fifth level</a:t>
+            </a:r>
+            <a:endParaRPr lang="en-US"/>
+          </a:p>
+        </p:txBody>
+      </p:sp>
+      <p:sp>
+        <p:nvSpPr>
+          <p:cNvPr id="6" name="Footer Placeholder 5"/>
+          <p:cNvSpPr>
+            <a:spLocks noGrp="1"/>
+          </p:cNvSpPr>
+          <p:nvPr>
+            <p:ph type="ftr" sz="quarter" idx="4"/>
+          </p:nvPr>
+        </p:nvSpPr>
+        <p:spPr>
+          <a:xfrm>
+            <a:off x="0" y="8685213"/>
+            <a:ext cx="2971800" cy="457200"/>
+          </a:xfrm>
+          <a:prstGeom prst="rect">
+            <a:avLst/>
+          </a:prstGeom>
+        </p:spPr>
+        <p:txBody>
+          <a:bodyPr vert="horz" lIns="91440" tIns="45720" rIns="91440" bIns="45720" rtlCol="0" anchor="b"/>
+          <a:lstStyle>
+            <a:lvl1pPr algn="l">
+              <a:defRPr sz="1200"/>
+            </a:lvl1pPr>
+          </a:lstStyle>
+          <a:p>
+            <a:endParaRPr lang="en-US"/>
+          </a:p>
+        </p:txBody>
+      </p:sp>
+      <p:sp>
+        <p:nvSpPr>
+          <p:cNvPr id="7" name="Slide Number Placeholder 6"/>
+          <p:cNvSpPr>
+            <a:spLocks noGrp="1"/>
+          </p:cNvSpPr>
+          <p:nvPr>
+            <p:ph type="sldNum" sz="quarter" idx="5"/>
+          </p:nvPr>
+        </p:nvSpPr>
+        <p:spPr>
+          <a:xfrm>
+            <a:off x="3884613" y="8685213"/>
+            <a:ext cx="2971800" cy="457200"/>
+          </a:xfrm>
+          <a:prstGeom prst="rect">
+            <a:avLst/>
+          </a:prstGeom>
+        </p:spPr>
+        <p:txBody>
+          <a:bodyPr vert="horz" lIns="91440" tIns="45720" rIns="91440" bIns="45720" rtlCol="0" anchor="b"/>
+          <a:lstStyle>
+            <a:lvl1pPr algn="r">
+              <a:defRPr sz="1200"/>
+            </a:lvl1pPr>
+          </a:lstStyle>
+          <a:p>
+            <a:fld id="{C4F08FE3-0ECC-DC4A-ADEA-5DFFA957F3EE}" type="slidenum">
+              <a:rPr lang="en-US" smtClean="0"/>
+              <a:t>‹#›</a:t>
+            </a:fld>
+            <a:endParaRPr lang="en-US"/>
+          </a:p>
+        </p:txBody>
+      </p:sp>
+    </p:spTree>
+    <p:extLst>
+      <p:ext uri="{BB962C8B-B14F-4D97-AF65-F5344CB8AC3E}">
+        <p14:creationId xmlns:p14="http://schemas.microsoft.com/office/powerpoint/2010/main" val="506962587"/>
+      </p:ext>
+    </p:extLst>
+  </p:cSld>
+  <p:clrMap bg1="lt1" tx1="dk1" bg2="lt2" tx2="dk2" accent1="accent1" accent2="accent2" accent3="accent3" accent4="accent4" accent5="accent5" accent6="accent6" hlink="hlink" folHlink="folHlink"/>
+  <p:notesStyle>
+    <a:lvl1pPr marL="0" algn="l" defTabSz="457200" rtl="0" eaLnBrk="1" latinLnBrk="0" hangingPunct="1">
+      <a:defRPr sz="1200" kern="1200">
+        <a:solidFill>
+          <a:schemeClr val="tx1"/>
+        </a:solidFill>
+        <a:latin typeface="+mn-lt"/>
+        <a:ea typeface="+mn-ea"/>
+        <a:cs typeface="+mn-cs"/>
+      </a:defRPr>
+    </a:lvl1pPr>
+    <a:lvl2pPr marL="457200" algn="l" defTabSz="457200" rtl="0" eaLnBrk="1" latinLnBrk="0" hangingPunct="1">
+      <a:defRPr sz="1200" kern="1200">
+        <a:solidFill>
+          <a:schemeClr val="tx1"/>
+        </a:solidFill>
+        <a:latin typeface="+mn-lt"/>
+        <a:ea typeface="+mn-ea"/>
+        <a:cs typeface="+mn-cs"/>
+      </a:defRPr>
+    </a:lvl2pPr>
+    <a:lvl3pPr marL="914400" algn="l" defTabSz="457200" rtl="0" eaLnBrk="1" latinLnBrk="0" hangingPunct="1">
+      <a:defRPr sz="1200" kern="1200">
+        <a:solidFill>
+          <a:schemeClr val="tx1"/>
+        </a:solidFill>
+        <a:latin typeface="+mn-lt"/>
+        <a:ea typeface="+mn-ea"/>
+        <a:cs typeface="+mn-cs"/>
+      </a:defRPr>
+    </a:lvl3pPr>
+    <a:lvl4pPr marL="1371600" algn="l" defTabSz="457200" rtl="0" eaLnBrk="1" latinLnBrk="0" hangingPunct="1">
+      <a:defRPr sz="1200" kern="1200">
+        <a:solidFill>
+          <a:schemeClr val="tx1"/>
+        </a:solidFill>
+        <a:latin typeface="+mn-lt"/>
+        <a:ea typeface="+mn-ea"/>
+        <a:cs typeface="+mn-cs"/>
+      </a:defRPr>
+    </a:lvl4pPr>
+    <a:lvl5pPr marL="1828800" algn="l" defTabSz="457200" rtl="0" eaLnBrk="1" latinLnBrk="0" hangingPunct="1">
+      <a:defRPr sz="1200" kern="1200">
+        <a:solidFill>
+          <a:schemeClr val="tx1"/>
+        </a:solidFill>
+        <a:latin typeface="+mn-lt"/>
+        <a:ea typeface="+mn-ea"/>
+        <a:cs typeface="+mn-cs"/>
+      </a:defRPr>
+    </a:lvl5pPr>
+    <a:lvl6pPr marL="2286000" algn="l" defTabSz="457200" rtl="0" eaLnBrk="1" latinLnBrk="0" hangingPunct="1">
+      <a:defRPr sz="1200" kern="1200">
+        <a:solidFill>
+          <a:schemeClr val="tx1"/>
+        </a:solidFill>
+        <a:latin typeface="+mn-lt"/>
+        <a:ea typeface="+mn-ea"/>
+        <a:cs typeface="+mn-cs"/>
+      </a:defRPr>
+    </a:lvl6pPr>
+    <a:lvl7pPr marL="2743200" algn="l" defTabSz="457200" rtl="0" eaLnBrk="1" latinLnBrk="0" hangingPunct="1">
+      <a:defRPr sz="1200" kern="1200">
+        <a:solidFill>
+          <a:schemeClr val="tx1"/>
+        </a:solidFill>
+        <a:latin typeface="+mn-lt"/>
+        <a:ea typeface="+mn-ea"/>
+        <a:cs typeface="+mn-cs"/>
+      </a:defRPr>
+    </a:lvl7pPr>
+    <a:lvl8pPr marL="3200400" algn="l" defTabSz="457200" rtl="0" eaLnBrk="1" latinLnBrk="0" hangingPunct="1">
+      <a:defRPr sz="1200" kern="1200">
+        <a:solidFill>
+          <a:schemeClr val="tx1"/>
+        </a:solidFill>
+        <a:latin typeface="+mn-lt"/>
+        <a:ea typeface="+mn-ea"/>
+        <a:cs typeface="+mn-cs"/>
+      </a:defRPr>
+    </a:lvl8pPr>
+    <a:lvl9pPr marL="3657600" algn="l" defTabSz="457200" rtl="0" eaLnBrk="1" latinLnBrk="0" hangingPunct="1">
+      <a:defRPr sz="1200" kern="1200">
+        <a:solidFill>
+          <a:schemeClr val="tx1"/>
+        </a:solidFill>
+        <a:latin typeface="+mn-lt"/>
+        <a:ea typeface="+mn-ea"/>
+        <a:cs typeface="+mn-cs"/>
+      </a:defRPr>
+    </a:lvl9pPr>
+  </p:notesStyle>
+</p:notesMaster>
+</file>
+
+<file path=ppt/notesSlides/notesSlide1.xml><?xml version="1.0" encoding="utf-8"?>
+<p:notes xmlns:a="http://schemas.openxmlformats.org/drawingml/2006/main" xmlns:r="http://schemas.openxmlformats.org/officeDocument/2006/relationships" xmlns:p="http://schemas.openxmlformats.org/presentationml/2006/main">
+  <p:cSld>
+    <p:spTree>
+      <p:nvGrpSpPr>
+        <p:cNvPr id="1" name=""/>
+        <p:cNvGrpSpPr/>
+        <p:nvPr/>
+      </p:nvGrpSpPr>
+      <p:grpSpPr>
+        <a:xfrm>
+          <a:off x="0" y="0"/>
+          <a:ext cx="0" cy="0"/>
+          <a:chOff x="0" y="0"/>
+          <a:chExt cx="0" cy="0"/>
+        </a:xfrm>
+      </p:grpSpPr>
+      <p:sp>
+        <p:nvSpPr>
+          <p:cNvPr id="2" name="Slide Image Placeholder 1"/>
+          <p:cNvSpPr>
+            <a:spLocks noGrp="1" noRot="1" noChangeAspect="1"/>
+          </p:cNvSpPr>
+          <p:nvPr>
+            <p:ph type="sldImg"/>
+          </p:nvPr>
+        </p:nvSpPr>
+        <p:spPr/>
+      </p:sp>
+      <p:sp>
+        <p:nvSpPr>
+          <p:cNvPr id="3" name="Notes Placeholder 2"/>
+          <p:cNvSpPr>
+            <a:spLocks noGrp="1"/>
+          </p:cNvSpPr>
+          <p:nvPr>
+            <p:ph type="body" idx="1"/>
+          </p:nvPr>
+        </p:nvSpPr>
+        <p:spPr/>
+        <p:txBody>
+          <a:bodyPr/>
+          <a:lstStyle/>
+          <a:p>
+            <a:endParaRPr lang="en-US" dirty="0"/>
+          </a:p>
+        </p:txBody>
+      </p:sp>
+      <p:sp>
+        <p:nvSpPr>
+          <p:cNvPr id="4" name="Slide Number Placeholder 3"/>
+          <p:cNvSpPr>
+            <a:spLocks noGrp="1"/>
+          </p:cNvSpPr>
+          <p:nvPr>
+            <p:ph type="sldNum" sz="quarter" idx="10"/>
+          </p:nvPr>
+        </p:nvSpPr>
+        <p:spPr/>
+        <p:txBody>
+          <a:bodyPr/>
+          <a:lstStyle/>
+          <a:p>
+            <a:fld id="{C4F08FE3-0ECC-DC4A-ADEA-5DFFA957F3EE}" type="slidenum">
+              <a:rPr lang="en-US" smtClean="0"/>
+              <a:t>20</a:t>
+            </a:fld>
+            <a:endParaRPr lang="en-US"/>
+          </a:p>
+        </p:txBody>
+      </p:sp>
+    </p:spTree>
+    <p:extLst>
+      <p:ext uri="{BB962C8B-B14F-4D97-AF65-F5344CB8AC3E}">
+        <p14:creationId xmlns:p14="http://schemas.microsoft.com/office/powerpoint/2010/main" val="1396688706"/>
+      </p:ext>
+    </p:extLst>
+  </p:cSld>
+  <p:clrMapOvr>
+    <a:masterClrMapping/>
+  </p:clrMapOvr>
+</p:notes>
+</file>
+
 <file path=ppt/slideLayouts/slideLayout1.xml><?xml version="1.0" encoding="utf-8"?>
 <p:sldLayout xmlns:a="http://schemas.openxmlformats.org/drawingml/2006/main" xmlns:r="http://schemas.openxmlformats.org/officeDocument/2006/relationships" xmlns:p="http://schemas.openxmlformats.org/presentationml/2006/main" showMasterSp="0" type="title" preserve="1">
   <p:cSld name="Title Slide">
@@ -521,7 +958,7 @@
             <a:fld id="{E637BB6B-EE1B-48FB-8575-0D55C373DE88}" type="datetimeFigureOut">
               <a:rPr lang="en-US" smtClean="0"/>
               <a:pPr eaLnBrk="1" latinLnBrk="0" hangingPunct="1"/>
-              <a:t>2/4/13</a:t>
+              <a:t>2/7/13</a:t>
             </a:fld>
             <a:endParaRPr lang="en-US"/>
           </a:p>
@@ -689,7 +1126,7 @@
             <a:fld id="{E637BB6B-EE1B-48FB-8575-0D55C373DE88}" type="datetimeFigureOut">
               <a:rPr lang="en-US" smtClean="0"/>
               <a:pPr eaLnBrk="1" latinLnBrk="0" hangingPunct="1"/>
-              <a:t>2/4/13</a:t>
+              <a:t>2/7/13</a:t>
             </a:fld>
             <a:endParaRPr lang="en-US" dirty="0"/>
           </a:p>
@@ -867,7 +1304,7 @@
             <a:fld id="{E637BB6B-EE1B-48FB-8575-0D55C373DE88}" type="datetimeFigureOut">
               <a:rPr lang="en-US" smtClean="0"/>
               <a:pPr eaLnBrk="1" latinLnBrk="0" hangingPunct="1"/>
-              <a:t>2/4/13</a:t>
+              <a:t>2/7/13</a:t>
             </a:fld>
             <a:endParaRPr lang="en-US"/>
           </a:p>
@@ -1039,7 +1476,7 @@
             <a:fld id="{E637BB6B-EE1B-48FB-8575-0D55C373DE88}" type="datetimeFigureOut">
               <a:rPr lang="en-US" smtClean="0"/>
               <a:pPr eaLnBrk="1" latinLnBrk="0" hangingPunct="1"/>
-              <a:t>2/4/13</a:t>
+              <a:t>2/7/13</a:t>
             </a:fld>
             <a:endParaRPr lang="en-US"/>
           </a:p>
@@ -1497,7 +1934,7 @@
             <a:fld id="{E637BB6B-EE1B-48FB-8575-0D55C373DE88}" type="datetimeFigureOut">
               <a:rPr lang="en-US" smtClean="0"/>
               <a:pPr eaLnBrk="1" latinLnBrk="0" hangingPunct="1"/>
-              <a:t>2/4/13</a:t>
+              <a:t>2/7/13</a:t>
             </a:fld>
             <a:endParaRPr lang="en-US"/>
           </a:p>
@@ -1764,7 +2201,7 @@
             <a:fld id="{E637BB6B-EE1B-48FB-8575-0D55C373DE88}" type="datetimeFigureOut">
               <a:rPr lang="en-US" smtClean="0"/>
               <a:pPr eaLnBrk="1" latinLnBrk="0" hangingPunct="1"/>
-              <a:t>2/4/13</a:t>
+              <a:t>2/7/13</a:t>
             </a:fld>
             <a:endParaRPr lang="en-US"/>
           </a:p>
@@ -2141,7 +2578,7 @@
             <a:fld id="{E637BB6B-EE1B-48FB-8575-0D55C373DE88}" type="datetimeFigureOut">
               <a:rPr lang="en-US" smtClean="0"/>
               <a:pPr eaLnBrk="1" latinLnBrk="0" hangingPunct="1"/>
-              <a:t>2/4/13</a:t>
+              <a:t>2/7/13</a:t>
             </a:fld>
             <a:endParaRPr lang="en-US"/>
           </a:p>
@@ -2266,7 +2703,7 @@
             <a:fld id="{E637BB6B-EE1B-48FB-8575-0D55C373DE88}" type="datetimeFigureOut">
               <a:rPr lang="en-US" smtClean="0"/>
               <a:pPr eaLnBrk="1" latinLnBrk="0" hangingPunct="1"/>
-              <a:t>2/4/13</a:t>
+              <a:t>2/7/13</a:t>
             </a:fld>
             <a:endParaRPr lang="en-US"/>
           </a:p>
@@ -2359,7 +2796,7 @@
             <a:fld id="{E637BB6B-EE1B-48FB-8575-0D55C373DE88}" type="datetimeFigureOut">
               <a:rPr lang="en-US" smtClean="0"/>
               <a:pPr eaLnBrk="1" latinLnBrk="0" hangingPunct="1"/>
-              <a:t>2/4/13</a:t>
+              <a:t>2/7/13</a:t>
             </a:fld>
             <a:endParaRPr lang="en-US"/>
           </a:p>
@@ -2611,7 +3048,7 @@
             <a:fld id="{E637BB6B-EE1B-48FB-8575-0D55C373DE88}" type="datetimeFigureOut">
               <a:rPr lang="en-US" smtClean="0"/>
               <a:pPr eaLnBrk="1" latinLnBrk="0" hangingPunct="1"/>
-              <a:t>2/4/13</a:t>
+              <a:t>2/7/13</a:t>
             </a:fld>
             <a:endParaRPr lang="en-US"/>
           </a:p>
@@ -2873,7 +3310,7 @@
             <a:fld id="{E637BB6B-EE1B-48FB-8575-0D55C373DE88}" type="datetimeFigureOut">
               <a:rPr lang="en-US" smtClean="0"/>
               <a:pPr eaLnBrk="1" latinLnBrk="0" hangingPunct="1"/>
-              <a:t>2/4/13</a:t>
+              <a:t>2/7/13</a:t>
             </a:fld>
             <a:endParaRPr lang="en-US"/>
           </a:p>
@@ -3280,7 +3717,7 @@
             <a:fld id="{E637BB6B-EE1B-48FB-8575-0D55C373DE88}" type="datetimeFigureOut">
               <a:rPr lang="en-US" smtClean="0"/>
               <a:pPr eaLnBrk="1" latinLnBrk="0" hangingPunct="1"/>
-              <a:t>2/4/13</a:t>
+              <a:t>2/7/13</a:t>
             </a:fld>
             <a:endParaRPr lang="en-US" sz="1000">
               <a:solidFill>
@@ -3763,6 +4200,13 @@
   <p:clrMapOvr>
     <a:masterClrMapping/>
   </p:clrMapOvr>
+  <p:timing>
+    <p:tnLst>
+      <p:par>
+        <p:cTn xmlns:p14="http://schemas.microsoft.com/office/powerpoint/2010/main" id="1" dur="indefinite" restart="never" nodeType="tmRoot"/>
+      </p:par>
+    </p:tnLst>
+  </p:timing>
 </p:sld>
 </file>
 
@@ -5449,16 +5893,21 @@
             </a:r>
             <a:r>
               <a:rPr lang="en-US" dirty="0" smtClean="0"/>
+              <a:t>) </a:t>
+            </a:r>
+            <a:r>
+              <a:rPr lang="en-US" dirty="0"/>
               <a:t>(</a:t>
             </a:r>
             <a:r>
-              <a:rPr lang="en-US" dirty="0" err="1" smtClean="0"/>
+              <a:rPr lang="en-US" dirty="0" err="1"/>
               <a:t>R.layout.l_layout</a:t>
             </a:r>
             <a:r>
-              <a:rPr lang="en-US" dirty="0" smtClean="0"/>
-              <a:t>);</a:t>
-            </a:r>
+              <a:rPr lang="en-US" dirty="0"/>
+              <a:t>;</a:t>
+            </a:r>
+            <a:endParaRPr lang="en-US" dirty="0" smtClean="0"/>
           </a:p>
           <a:p>
             <a:pPr marL="36576" indent="0">
@@ -5867,6 +6316,13 @@
   <p:clrMapOvr>
     <a:masterClrMapping/>
   </p:clrMapOvr>
+  <p:timing>
+    <p:tnLst>
+      <p:par>
+        <p:cTn xmlns:p14="http://schemas.microsoft.com/office/powerpoint/2010/main" id="1" dur="indefinite" restart="never" nodeType="tmRoot"/>
+      </p:par>
+    </p:tnLst>
+  </p:timing>
 </p:sld>
 </file>
 
@@ -7649,6 +8105,13 @@
   <p:clrMapOvr>
     <a:masterClrMapping/>
   </p:clrMapOvr>
+  <p:timing>
+    <p:tnLst>
+      <p:par>
+        <p:cTn xmlns:p14="http://schemas.microsoft.com/office/powerpoint/2010/main" id="1" dur="indefinite" restart="never" nodeType="tmRoot"/>
+      </p:par>
+    </p:tnLst>
+  </p:timing>
 </p:sld>
 </file>
 
@@ -7770,6 +8233,13 @@
   <p:clrMapOvr>
     <a:masterClrMapping/>
   </p:clrMapOvr>
+  <p:timing>
+    <p:tnLst>
+      <p:par>
+        <p:cTn xmlns:p14="http://schemas.microsoft.com/office/powerpoint/2010/main" id="1" dur="indefinite" restart="never" nodeType="tmRoot"/>
+      </p:par>
+    </p:tnLst>
+  </p:timing>
 </p:sld>
 </file>
 
@@ -7900,6 +8370,13 @@
   <p:clrMapOvr>
     <a:masterClrMapping/>
   </p:clrMapOvr>
+  <p:timing>
+    <p:tnLst>
+      <p:par>
+        <p:cTn xmlns:p14="http://schemas.microsoft.com/office/powerpoint/2010/main" id="1" dur="indefinite" restart="never" nodeType="tmRoot"/>
+      </p:par>
+    </p:tnLst>
+  </p:timing>
 </p:sld>
 </file>
 
@@ -7976,6 +8453,13 @@
   <p:clrMapOvr>
     <a:masterClrMapping/>
   </p:clrMapOvr>
+  <p:timing>
+    <p:tnLst>
+      <p:par>
+        <p:cTn xmlns:p14="http://schemas.microsoft.com/office/powerpoint/2010/main" id="1" dur="indefinite" restart="never" nodeType="tmRoot"/>
+      </p:par>
+    </p:tnLst>
+  </p:timing>
 </p:sld>
 </file>
 
@@ -8093,6 +8577,13 @@
   <p:clrMapOvr>
     <a:masterClrMapping/>
   </p:clrMapOvr>
+  <p:timing>
+    <p:tnLst>
+      <p:par>
+        <p:cTn xmlns:p14="http://schemas.microsoft.com/office/powerpoint/2010/main" id="1" dur="indefinite" restart="never" nodeType="tmRoot"/>
+      </p:par>
+    </p:tnLst>
+  </p:timing>
 </p:sld>
 </file>
 
@@ -8205,6 +8696,13 @@
   <p:clrMapOvr>
     <a:masterClrMapping/>
   </p:clrMapOvr>
+  <p:timing>
+    <p:tnLst>
+      <p:par>
+        <p:cTn xmlns:p14="http://schemas.microsoft.com/office/powerpoint/2010/main" id="1" dur="indefinite" restart="never" nodeType="tmRoot"/>
+      </p:par>
+    </p:tnLst>
+  </p:timing>
 </p:sld>
 </file>
 
@@ -8270,8 +8768,8 @@
         </p:blipFill>
         <p:spPr>
           <a:xfrm>
-            <a:off x="2388969" y="1615447"/>
-            <a:ext cx="3606751" cy="4661357"/>
+            <a:off x="3580273" y="274638"/>
+            <a:ext cx="4650557" cy="6010370"/>
           </a:xfrm>
           <a:prstGeom prst="rect">
             <a:avLst/>
@@ -8660,4 +9158,324 @@
   </a:objectDefaults>
   <a:extraClrSchemeLst/>
 </a:theme>
+</file>
+
+<file path=ppt/theme/theme2.xml><?xml version="1.0" encoding="utf-8"?>
+<a:theme xmlns:a="http://schemas.openxmlformats.org/drawingml/2006/main" name="Office Theme">
+  <a:themeElements>
+    <a:clrScheme name="Office">
+      <a:dk1>
+        <a:sysClr val="windowText" lastClr="000000"/>
+      </a:dk1>
+      <a:lt1>
+        <a:sysClr val="window" lastClr="FFFFFF"/>
+      </a:lt1>
+      <a:dk2>
+        <a:srgbClr val="1F497D"/>
+      </a:dk2>
+      <a:lt2>
+        <a:srgbClr val="EEECE1"/>
+      </a:lt2>
+      <a:accent1>
+        <a:srgbClr val="4F81BD"/>
+      </a:accent1>
+      <a:accent2>
+        <a:srgbClr val="C0504D"/>
+      </a:accent2>
+      <a:accent3>
+        <a:srgbClr val="9BBB59"/>
+      </a:accent3>
+      <a:accent4>
+        <a:srgbClr val="8064A2"/>
+      </a:accent4>
+      <a:accent5>
+        <a:srgbClr val="4BACC6"/>
+      </a:accent5>
+      <a:accent6>
+        <a:srgbClr val="F79646"/>
+      </a:accent6>
+      <a:hlink>
+        <a:srgbClr val="0000FF"/>
+      </a:hlink>
+      <a:folHlink>
+        <a:srgbClr val="800080"/>
+      </a:folHlink>
+    </a:clrScheme>
+    <a:fontScheme name="Office">
+      <a:majorFont>
+        <a:latin typeface="Calibri"/>
+        <a:ea typeface=""/>
+        <a:cs typeface=""/>
+        <a:font script="Jpan" typeface="ＭＳ Ｐゴシック"/>
+        <a:font script="Hang" typeface="맑은 고딕"/>
+        <a:font script="Hans" typeface="宋体"/>
+        <a:font script="Hant" typeface="新細明體"/>
+        <a:font script="Arab" typeface="Times New Roman"/>
+        <a:font script="Hebr" typeface="Times New Roman"/>
+        <a:font script="Thai" typeface="Angsana New"/>
+        <a:font script="Ethi" typeface="Nyala"/>
+        <a:font script="Beng" typeface="Vrinda"/>
+        <a:font script="Gujr" typeface="Shruti"/>
+        <a:font script="Khmr" typeface="MoolBoran"/>
+        <a:font script="Knda" typeface="Tunga"/>
+        <a:font script="Guru" typeface="Raavi"/>
+        <a:font script="Cans" typeface="Euphemia"/>
+        <a:font script="Cher" typeface="Plantagenet Cherokee"/>
+        <a:font script="Yiii" typeface="Microsoft Yi Baiti"/>
+        <a:font script="Tibt" typeface="Microsoft Himalaya"/>
+        <a:font script="Thaa" typeface="MV Boli"/>
+        <a:font script="Deva" typeface="Mangal"/>
+        <a:font script="Telu" typeface="Gautami"/>
+        <a:font script="Taml" typeface="Latha"/>
+        <a:font script="Syrc" typeface="Estrangelo Edessa"/>
+        <a:font script="Orya" typeface="Kalinga"/>
+        <a:font script="Mlym" typeface="Kartika"/>
+        <a:font script="Laoo" typeface="DokChampa"/>
+        <a:font script="Sinh" typeface="Iskoola Pota"/>
+        <a:font script="Mong" typeface="Mongolian Baiti"/>
+        <a:font script="Viet" typeface="Times New Roman"/>
+        <a:font script="Uigh" typeface="Microsoft Uighur"/>
+        <a:font script="Geor" typeface="Sylfaen"/>
+      </a:majorFont>
+      <a:minorFont>
+        <a:latin typeface="Calibri"/>
+        <a:ea typeface=""/>
+        <a:cs typeface=""/>
+        <a:font script="Jpan" typeface="ＭＳ Ｐゴシック"/>
+        <a:font script="Hang" typeface="맑은 고딕"/>
+        <a:font script="Hans" typeface="宋体"/>
+        <a:font script="Hant" typeface="新細明體"/>
+        <a:font script="Arab" typeface="Arial"/>
+        <a:font script="Hebr" typeface="Arial"/>
+        <a:font script="Thai" typeface="Cordia New"/>
+        <a:font script="Ethi" typeface="Nyala"/>
+        <a:font script="Beng" typeface="Vrinda"/>
+        <a:font script="Gujr" typeface="Shruti"/>
+        <a:font script="Khmr" typeface="DaunPenh"/>
+        <a:font script="Knda" typeface="Tunga"/>
+        <a:font script="Guru" typeface="Raavi"/>
+        <a:font script="Cans" typeface="Euphemia"/>
+        <a:font script="Cher" typeface="Plantagenet Cherokee"/>
+        <a:font script="Yiii" typeface="Microsoft Yi Baiti"/>
+        <a:font script="Tibt" typeface="Microsoft Himalaya"/>
+        <a:font script="Thaa" typeface="MV Boli"/>
+        <a:font script="Deva" typeface="Mangal"/>
+        <a:font script="Telu" typeface="Gautami"/>
+        <a:font script="Taml" typeface="Latha"/>
+        <a:font script="Syrc" typeface="Estrangelo Edessa"/>
+        <a:font script="Orya" typeface="Kalinga"/>
+        <a:font script="Mlym" typeface="Kartika"/>
+        <a:font script="Laoo" typeface="DokChampa"/>
+        <a:font script="Sinh" typeface="Iskoola Pota"/>
+        <a:font script="Mong" typeface="Mongolian Baiti"/>
+        <a:font script="Viet" typeface="Arial"/>
+        <a:font script="Uigh" typeface="Microsoft Uighur"/>
+        <a:font script="Geor" typeface="Sylfaen"/>
+      </a:minorFont>
+    </a:fontScheme>
+    <a:fmtScheme name="Office">
+      <a:fillStyleLst>
+        <a:solidFill>
+          <a:schemeClr val="phClr"/>
+        </a:solidFill>
+        <a:gradFill rotWithShape="1">
+          <a:gsLst>
+            <a:gs pos="0">
+              <a:schemeClr val="phClr">
+                <a:tint val="50000"/>
+                <a:satMod val="300000"/>
+              </a:schemeClr>
+            </a:gs>
+            <a:gs pos="35000">
+              <a:schemeClr val="phClr">
+                <a:tint val="37000"/>
+                <a:satMod val="300000"/>
+              </a:schemeClr>
+            </a:gs>
+            <a:gs pos="100000">
+              <a:schemeClr val="phClr">
+                <a:tint val="15000"/>
+                <a:satMod val="350000"/>
+              </a:schemeClr>
+            </a:gs>
+          </a:gsLst>
+          <a:lin ang="16200000" scaled="1"/>
+        </a:gradFill>
+        <a:gradFill rotWithShape="1">
+          <a:gsLst>
+            <a:gs pos="0">
+              <a:schemeClr val="phClr">
+                <a:tint val="100000"/>
+                <a:shade val="100000"/>
+                <a:satMod val="130000"/>
+              </a:schemeClr>
+            </a:gs>
+            <a:gs pos="100000">
+              <a:schemeClr val="phClr">
+                <a:tint val="50000"/>
+                <a:shade val="100000"/>
+                <a:satMod val="350000"/>
+              </a:schemeClr>
+            </a:gs>
+          </a:gsLst>
+          <a:lin ang="16200000" scaled="0"/>
+        </a:gradFill>
+      </a:fillStyleLst>
+      <a:lnStyleLst>
+        <a:ln w="9525" cap="flat" cmpd="sng" algn="ctr">
+          <a:solidFill>
+            <a:schemeClr val="phClr">
+              <a:shade val="95000"/>
+              <a:satMod val="105000"/>
+            </a:schemeClr>
+          </a:solidFill>
+          <a:prstDash val="solid"/>
+        </a:ln>
+        <a:ln w="25400" cap="flat" cmpd="sng" algn="ctr">
+          <a:solidFill>
+            <a:schemeClr val="phClr"/>
+          </a:solidFill>
+          <a:prstDash val="solid"/>
+        </a:ln>
+        <a:ln w="38100" cap="flat" cmpd="sng" algn="ctr">
+          <a:solidFill>
+            <a:schemeClr val="phClr"/>
+          </a:solidFill>
+          <a:prstDash val="solid"/>
+        </a:ln>
+      </a:lnStyleLst>
+      <a:effectStyleLst>
+        <a:effectStyle>
+          <a:effectLst>
+            <a:outerShdw blurRad="40000" dist="20000" dir="5400000" rotWithShape="0">
+              <a:srgbClr val="000000">
+                <a:alpha val="38000"/>
+              </a:srgbClr>
+            </a:outerShdw>
+          </a:effectLst>
+        </a:effectStyle>
+        <a:effectStyle>
+          <a:effectLst>
+            <a:outerShdw blurRad="40000" dist="23000" dir="5400000" rotWithShape="0">
+              <a:srgbClr val="000000">
+                <a:alpha val="35000"/>
+              </a:srgbClr>
+            </a:outerShdw>
+          </a:effectLst>
+        </a:effectStyle>
+        <a:effectStyle>
+          <a:effectLst>
+            <a:outerShdw blurRad="40000" dist="23000" dir="5400000" rotWithShape="0">
+              <a:srgbClr val="000000">
+                <a:alpha val="35000"/>
+              </a:srgbClr>
+            </a:outerShdw>
+          </a:effectLst>
+          <a:scene3d>
+            <a:camera prst="orthographicFront">
+              <a:rot lat="0" lon="0" rev="0"/>
+            </a:camera>
+            <a:lightRig rig="threePt" dir="t">
+              <a:rot lat="0" lon="0" rev="1200000"/>
+            </a:lightRig>
+          </a:scene3d>
+          <a:sp3d>
+            <a:bevelT w="63500" h="25400"/>
+          </a:sp3d>
+        </a:effectStyle>
+      </a:effectStyleLst>
+      <a:bgFillStyleLst>
+        <a:solidFill>
+          <a:schemeClr val="phClr"/>
+        </a:solidFill>
+        <a:gradFill rotWithShape="1">
+          <a:gsLst>
+            <a:gs pos="0">
+              <a:schemeClr val="phClr">
+                <a:tint val="40000"/>
+                <a:satMod val="350000"/>
+              </a:schemeClr>
+            </a:gs>
+            <a:gs pos="40000">
+              <a:schemeClr val="phClr">
+                <a:tint val="45000"/>
+                <a:shade val="99000"/>
+                <a:satMod val="350000"/>
+              </a:schemeClr>
+            </a:gs>
+            <a:gs pos="100000">
+              <a:schemeClr val="phClr">
+                <a:shade val="20000"/>
+                <a:satMod val="255000"/>
+              </a:schemeClr>
+            </a:gs>
+          </a:gsLst>
+          <a:path path="circle">
+            <a:fillToRect l="50000" t="-80000" r="50000" b="180000"/>
+          </a:path>
+        </a:gradFill>
+        <a:gradFill rotWithShape="1">
+          <a:gsLst>
+            <a:gs pos="0">
+              <a:schemeClr val="phClr">
+                <a:tint val="80000"/>
+                <a:satMod val="300000"/>
+              </a:schemeClr>
+            </a:gs>
+            <a:gs pos="100000">
+              <a:schemeClr val="phClr">
+                <a:shade val="30000"/>
+                <a:satMod val="200000"/>
+              </a:schemeClr>
+            </a:gs>
+          </a:gsLst>
+          <a:path path="circle">
+            <a:fillToRect l="50000" t="50000" r="50000" b="50000"/>
+          </a:path>
+        </a:gradFill>
+      </a:bgFillStyleLst>
+    </a:fmtScheme>
+  </a:themeElements>
+  <a:objectDefaults>
+    <a:spDef>
+      <a:spPr/>
+      <a:bodyPr/>
+      <a:lstStyle/>
+      <a:style>
+        <a:lnRef idx="1">
+          <a:schemeClr val="accent1"/>
+        </a:lnRef>
+        <a:fillRef idx="3">
+          <a:schemeClr val="accent1"/>
+        </a:fillRef>
+        <a:effectRef idx="2">
+          <a:schemeClr val="accent1"/>
+        </a:effectRef>
+        <a:fontRef idx="minor">
+          <a:schemeClr val="lt1"/>
+        </a:fontRef>
+      </a:style>
+    </a:spDef>
+    <a:lnDef>
+      <a:spPr/>
+      <a:bodyPr/>
+      <a:lstStyle/>
+      <a:style>
+        <a:lnRef idx="2">
+          <a:schemeClr val="accent1"/>
+        </a:lnRef>
+        <a:fillRef idx="0">
+          <a:schemeClr val="accent1"/>
+        </a:fillRef>
+        <a:effectRef idx="1">
+          <a:schemeClr val="accent1"/>
+        </a:effectRef>
+        <a:fontRef idx="minor">
+          <a:schemeClr val="tx1"/>
+        </a:fontRef>
+      </a:style>
+    </a:lnDef>
+  </a:objectDefaults>
+  <a:extraClrSchemeLst/>
+</a:theme>
 </file>
</xml_diff>